<commit_message>
Update 6A - Linear Regression models.pptx
</commit_message>
<xml_diff>
--- a/Presentations/6A - Linear Regression models.pptx
+++ b/Presentations/6A - Linear Regression models.pptx
@@ -5,7 +5,7 @@
     <p:sldMasterId id="2147483648" r:id="rId1"/>
   </p:sldMasterIdLst>
   <p:notesMasterIdLst>
-    <p:notesMasterId r:id="rId15"/>
+    <p:notesMasterId r:id="rId16"/>
   </p:notesMasterIdLst>
   <p:sldIdLst>
     <p:sldId id="291" r:id="rId2"/>
@@ -20,7 +20,8 @@
     <p:sldId id="320" r:id="rId11"/>
     <p:sldId id="321" r:id="rId12"/>
     <p:sldId id="322" r:id="rId13"/>
-    <p:sldId id="324" r:id="rId14"/>
+    <p:sldId id="325" r:id="rId14"/>
+    <p:sldId id="324" r:id="rId15"/>
   </p:sldIdLst>
   <p:sldSz cx="12192000" cy="6858000"/>
   <p:notesSz cx="6858000" cy="9144000"/>
@@ -6105,6 +6106,1064 @@
   <p:cSld>
     <p:spTree>
       <p:nvGrpSpPr>
+        <p:cNvPr id="1" name="">
+          <a:extLst>
+            <a:ext uri="{FF2B5EF4-FFF2-40B4-BE49-F238E27FC236}">
+              <a16:creationId xmlns:a16="http://schemas.microsoft.com/office/drawing/2014/main" id="{79B1A6D3-80DC-502F-F211-05E1841F51D5}"/>
+            </a:ext>
+          </a:extLst>
+        </p:cNvPr>
+        <p:cNvGrpSpPr/>
+        <p:nvPr/>
+      </p:nvGrpSpPr>
+      <p:grpSpPr>
+        <a:xfrm>
+          <a:off x="0" y="0"/>
+          <a:ext cx="0" cy="0"/>
+          <a:chOff x="0" y="0"/>
+          <a:chExt cx="0" cy="0"/>
+        </a:xfrm>
+      </p:grpSpPr>
+      <p:sp>
+        <p:nvSpPr>
+          <p:cNvPr id="3" name="Title 2">
+            <a:extLst>
+              <a:ext uri="{FF2B5EF4-FFF2-40B4-BE49-F238E27FC236}">
+                <a16:creationId xmlns:a16="http://schemas.microsoft.com/office/drawing/2014/main" id="{1F891B64-EC79-5B86-6224-5D9F48A74C81}"/>
+              </a:ext>
+            </a:extLst>
+          </p:cNvPr>
+          <p:cNvSpPr>
+            <a:spLocks noGrp="1"/>
+          </p:cNvSpPr>
+          <p:nvPr>
+            <p:ph type="ctrTitle"/>
+          </p:nvPr>
+        </p:nvSpPr>
+        <p:spPr>
+          <a:xfrm>
+            <a:off x="0" y="250878"/>
+            <a:ext cx="12007843" cy="811807"/>
+          </a:xfrm>
+        </p:spPr>
+        <p:txBody>
+          <a:bodyPr/>
+          <a:lstStyle/>
+          <a:p>
+            <a:pPr>
+              <a:lnSpc>
+                <a:spcPct val="100000"/>
+              </a:lnSpc>
+            </a:pPr>
+            <a:r>
+              <a:rPr lang="en-US" dirty="0">
+                <a:latin typeface="Arial" panose="020B0604020202020204" pitchFamily="34" charset="0"/>
+                <a:cs typeface="Arial" panose="020B0604020202020204" pitchFamily="34" charset="0"/>
+              </a:rPr>
+              <a:t>Linear regression (Glucose ~ Pregnancy + Age)</a:t>
+            </a:r>
+          </a:p>
+        </p:txBody>
+      </p:sp>
+      <p:pic>
+        <p:nvPicPr>
+          <p:cNvPr id="7" name="Picture 6">
+            <a:extLst>
+              <a:ext uri="{FF2B5EF4-FFF2-40B4-BE49-F238E27FC236}">
+                <a16:creationId xmlns:a16="http://schemas.microsoft.com/office/drawing/2014/main" id="{4B30B154-5E40-5874-AE95-6017A32E7542}"/>
+              </a:ext>
+            </a:extLst>
+          </p:cNvPr>
+          <p:cNvPicPr>
+            <a:picLocks noChangeAspect="1"/>
+          </p:cNvPicPr>
+          <p:nvPr/>
+        </p:nvPicPr>
+        <p:blipFill>
+          <a:blip r:embed="rId2"/>
+          <a:stretch>
+            <a:fillRect/>
+          </a:stretch>
+        </p:blipFill>
+        <p:spPr>
+          <a:xfrm>
+            <a:off x="668956" y="1272942"/>
+            <a:ext cx="5345696" cy="3021934"/>
+          </a:xfrm>
+          <a:prstGeom prst="rect">
+            <a:avLst/>
+          </a:prstGeom>
+        </p:spPr>
+      </p:pic>
+      <p:pic>
+        <p:nvPicPr>
+          <p:cNvPr id="5" name="Picture 4">
+            <a:extLst>
+              <a:ext uri="{FF2B5EF4-FFF2-40B4-BE49-F238E27FC236}">
+                <a16:creationId xmlns:a16="http://schemas.microsoft.com/office/drawing/2014/main" id="{963D0D20-451C-A34E-6837-D2842A522F59}"/>
+              </a:ext>
+            </a:extLst>
+          </p:cNvPr>
+          <p:cNvPicPr>
+            <a:picLocks noChangeAspect="1"/>
+          </p:cNvPicPr>
+          <p:nvPr/>
+        </p:nvPicPr>
+        <p:blipFill>
+          <a:blip r:embed="rId3"/>
+          <a:stretch>
+            <a:fillRect/>
+          </a:stretch>
+        </p:blipFill>
+        <p:spPr>
+          <a:xfrm>
+            <a:off x="6177350" y="1294654"/>
+            <a:ext cx="3971429" cy="790476"/>
+          </a:xfrm>
+          <a:prstGeom prst="rect">
+            <a:avLst/>
+          </a:prstGeom>
+        </p:spPr>
+      </p:pic>
+      <mc:AlternateContent xmlns:mc="http://schemas.openxmlformats.org/markup-compatibility/2006">
+        <mc:Choice xmlns:a14="http://schemas.microsoft.com/office/drawing/2010/main" Requires="a14">
+          <p:sp>
+            <p:nvSpPr>
+              <p:cNvPr id="4" name="TextBox 3">
+                <a:extLst>
+                  <a:ext uri="{FF2B5EF4-FFF2-40B4-BE49-F238E27FC236}">
+                    <a16:creationId xmlns:a16="http://schemas.microsoft.com/office/drawing/2014/main" id="{951A739A-6093-DE71-A396-46F1A2858793}"/>
+                  </a:ext>
+                </a:extLst>
+              </p:cNvPr>
+              <p:cNvSpPr txBox="1"/>
+              <p:nvPr/>
+            </p:nvSpPr>
+            <p:spPr>
+              <a:xfrm>
+                <a:off x="854903" y="4603055"/>
+                <a:ext cx="9538124" cy="553998"/>
+              </a:xfrm>
+              <a:prstGeom prst="rect">
+                <a:avLst/>
+              </a:prstGeom>
+              <a:noFill/>
+            </p:spPr>
+            <p:txBody>
+              <a:bodyPr wrap="none" lIns="0" tIns="0" rIns="0" bIns="0" rtlCol="0">
+                <a:spAutoFit/>
+              </a:bodyPr>
+              <a:lstStyle/>
+              <a:p>
+                <a:pPr/>
+                <a14:m>
+                  <m:oMathPara xmlns:m="http://schemas.openxmlformats.org/officeDocument/2006/math">
+                    <m:oMathParaPr>
+                      <m:jc m:val="centerGroup"/>
+                    </m:oMathParaPr>
+                    <m:oMath xmlns:m="http://schemas.openxmlformats.org/officeDocument/2006/math">
+                      <m:r>
+                        <a:rPr lang="en-US" sz="3600" b="0" i="1" smtClean="0">
+                          <a:solidFill>
+                            <a:schemeClr val="bg1"/>
+                          </a:solidFill>
+                          <a:latin typeface="Cambria Math" panose="02040503050406030204" pitchFamily="18" charset="0"/>
+                        </a:rPr>
+                        <m:t>𝐺𝑙𝑢𝑐𝑜𝑠𝑒</m:t>
+                      </m:r>
+                      <m:r>
+                        <a:rPr lang="en-US" sz="3600" b="0" i="1" smtClean="0">
+                          <a:solidFill>
+                            <a:schemeClr val="bg1"/>
+                          </a:solidFill>
+                          <a:latin typeface="Cambria Math" panose="02040503050406030204" pitchFamily="18" charset="0"/>
+                        </a:rPr>
+                        <m:t>= </m:t>
+                      </m:r>
+                      <m:sSub>
+                        <m:sSubPr>
+                          <m:ctrlPr>
+                            <a:rPr lang="en-US" sz="3600" b="0" i="1" smtClean="0">
+                              <a:solidFill>
+                                <a:schemeClr val="bg1"/>
+                              </a:solidFill>
+                              <a:latin typeface="Cambria Math" panose="02040503050406030204" pitchFamily="18" charset="0"/>
+                            </a:rPr>
+                          </m:ctrlPr>
+                        </m:sSubPr>
+                        <m:e>
+                          <m:r>
+                            <a:rPr lang="en-US" sz="3600" b="0" i="1" smtClean="0">
+                              <a:solidFill>
+                                <a:schemeClr val="bg1"/>
+                              </a:solidFill>
+                              <a:latin typeface="Cambria Math" panose="02040503050406030204" pitchFamily="18" charset="0"/>
+                              <a:ea typeface="Cambria Math" panose="02040503050406030204" pitchFamily="18" charset="0"/>
+                            </a:rPr>
+                            <m:t>𝛽</m:t>
+                          </m:r>
+                        </m:e>
+                        <m:sub>
+                          <m:r>
+                            <a:rPr lang="en-US" sz="3600" b="0" i="1" smtClean="0">
+                              <a:solidFill>
+                                <a:schemeClr val="bg1"/>
+                              </a:solidFill>
+                              <a:latin typeface="Cambria Math" panose="02040503050406030204" pitchFamily="18" charset="0"/>
+                            </a:rPr>
+                            <m:t>0</m:t>
+                          </m:r>
+                        </m:sub>
+                      </m:sSub>
+                      <m:r>
+                        <a:rPr lang="en-US" sz="3600" b="0" i="1" smtClean="0">
+                          <a:solidFill>
+                            <a:schemeClr val="bg1"/>
+                          </a:solidFill>
+                          <a:latin typeface="Cambria Math" panose="02040503050406030204" pitchFamily="18" charset="0"/>
+                        </a:rPr>
+                        <m:t>+</m:t>
+                      </m:r>
+                      <m:sSub>
+                        <m:sSubPr>
+                          <m:ctrlPr>
+                            <a:rPr lang="en-US" sz="3600" b="0" i="1" smtClean="0">
+                              <a:solidFill>
+                                <a:schemeClr val="bg1"/>
+                              </a:solidFill>
+                              <a:latin typeface="Cambria Math" panose="02040503050406030204" pitchFamily="18" charset="0"/>
+                            </a:rPr>
+                          </m:ctrlPr>
+                        </m:sSubPr>
+                        <m:e>
+                          <m:r>
+                            <a:rPr lang="en-US" sz="3600" b="0" i="1" smtClean="0">
+                              <a:solidFill>
+                                <a:schemeClr val="bg1"/>
+                              </a:solidFill>
+                              <a:latin typeface="Cambria Math" panose="02040503050406030204" pitchFamily="18" charset="0"/>
+                              <a:ea typeface="Cambria Math" panose="02040503050406030204" pitchFamily="18" charset="0"/>
+                            </a:rPr>
+                            <m:t>𝛽</m:t>
+                          </m:r>
+                        </m:e>
+                        <m:sub>
+                          <m:r>
+                            <a:rPr lang="en-US" sz="3600" b="0" i="1" smtClean="0">
+                              <a:solidFill>
+                                <a:schemeClr val="bg1"/>
+                              </a:solidFill>
+                              <a:latin typeface="Cambria Math" panose="02040503050406030204" pitchFamily="18" charset="0"/>
+                            </a:rPr>
+                            <m:t>1</m:t>
+                          </m:r>
+                        </m:sub>
+                      </m:sSub>
+                      <m:d>
+                        <m:dPr>
+                          <m:ctrlPr>
+                            <a:rPr lang="en-US" sz="3600" b="0" i="1" smtClean="0">
+                              <a:solidFill>
+                                <a:schemeClr val="bg1"/>
+                              </a:solidFill>
+                              <a:latin typeface="Cambria Math" panose="02040503050406030204" pitchFamily="18" charset="0"/>
+                            </a:rPr>
+                          </m:ctrlPr>
+                        </m:dPr>
+                        <m:e>
+                          <m:r>
+                            <a:rPr lang="en-US" sz="3600" b="0" i="1" smtClean="0">
+                              <a:solidFill>
+                                <a:schemeClr val="bg1"/>
+                              </a:solidFill>
+                              <a:latin typeface="Cambria Math" panose="02040503050406030204" pitchFamily="18" charset="0"/>
+                            </a:rPr>
+                            <m:t>𝑃𝑟𝑒𝑔𝑛𝑎𝑛𝑐𝑦</m:t>
+                          </m:r>
+                        </m:e>
+                      </m:d>
+                      <m:r>
+                        <a:rPr lang="en-US" sz="3600" i="1">
+                          <a:solidFill>
+                            <a:schemeClr val="bg1"/>
+                          </a:solidFill>
+                          <a:latin typeface="Cambria Math" panose="02040503050406030204" pitchFamily="18" charset="0"/>
+                        </a:rPr>
+                        <m:t>+</m:t>
+                      </m:r>
+                      <m:sSub>
+                        <m:sSubPr>
+                          <m:ctrlPr>
+                            <a:rPr lang="en-US" sz="3600" i="1">
+                              <a:solidFill>
+                                <a:schemeClr val="bg1"/>
+                              </a:solidFill>
+                              <a:latin typeface="Cambria Math" panose="02040503050406030204" pitchFamily="18" charset="0"/>
+                            </a:rPr>
+                          </m:ctrlPr>
+                        </m:sSubPr>
+                        <m:e>
+                          <m:r>
+                            <a:rPr lang="en-US" sz="3600" i="1">
+                              <a:solidFill>
+                                <a:schemeClr val="bg1"/>
+                              </a:solidFill>
+                              <a:latin typeface="Cambria Math" panose="02040503050406030204" pitchFamily="18" charset="0"/>
+                              <a:ea typeface="Cambria Math" panose="02040503050406030204" pitchFamily="18" charset="0"/>
+                            </a:rPr>
+                            <m:t>𝛽</m:t>
+                          </m:r>
+                        </m:e>
+                        <m:sub>
+                          <m:r>
+                            <a:rPr lang="en-US" sz="3600" b="0" i="1" smtClean="0">
+                              <a:solidFill>
+                                <a:schemeClr val="bg1"/>
+                              </a:solidFill>
+                              <a:latin typeface="Cambria Math" panose="02040503050406030204" pitchFamily="18" charset="0"/>
+                              <a:ea typeface="Cambria Math" panose="02040503050406030204" pitchFamily="18" charset="0"/>
+                            </a:rPr>
+                            <m:t>2</m:t>
+                          </m:r>
+                        </m:sub>
+                      </m:sSub>
+                      <m:d>
+                        <m:dPr>
+                          <m:ctrlPr>
+                            <a:rPr lang="en-US" sz="3600" i="1">
+                              <a:solidFill>
+                                <a:schemeClr val="bg1"/>
+                              </a:solidFill>
+                              <a:latin typeface="Cambria Math" panose="02040503050406030204" pitchFamily="18" charset="0"/>
+                            </a:rPr>
+                          </m:ctrlPr>
+                        </m:dPr>
+                        <m:e>
+                          <m:r>
+                            <a:rPr lang="en-US" sz="3600" b="0" i="1" smtClean="0">
+                              <a:solidFill>
+                                <a:schemeClr val="bg1"/>
+                              </a:solidFill>
+                              <a:latin typeface="Cambria Math" panose="02040503050406030204" pitchFamily="18" charset="0"/>
+                            </a:rPr>
+                            <m:t>𝐴𝑔𝑒</m:t>
+                          </m:r>
+                        </m:e>
+                      </m:d>
+                      <m:r>
+                        <a:rPr lang="en-US" sz="3600" b="0" i="1" smtClean="0">
+                          <a:solidFill>
+                            <a:schemeClr val="bg1"/>
+                          </a:solidFill>
+                          <a:latin typeface="Cambria Math" panose="02040503050406030204" pitchFamily="18" charset="0"/>
+                        </a:rPr>
+                        <m:t>+</m:t>
+                      </m:r>
+                      <m:r>
+                        <a:rPr lang="en-US" sz="3600" b="0" i="1" smtClean="0">
+                          <a:solidFill>
+                            <a:schemeClr val="bg1"/>
+                          </a:solidFill>
+                          <a:latin typeface="Cambria Math" panose="02040503050406030204" pitchFamily="18" charset="0"/>
+                          <a:ea typeface="Cambria Math" panose="02040503050406030204" pitchFamily="18" charset="0"/>
+                        </a:rPr>
+                        <m:t>𝜀</m:t>
+                      </m:r>
+                    </m:oMath>
+                  </m:oMathPara>
+                </a14:m>
+                <a:endParaRPr lang="en-US" sz="3600" dirty="0">
+                  <a:solidFill>
+                    <a:schemeClr val="bg1"/>
+                  </a:solidFill>
+                </a:endParaRPr>
+              </a:p>
+            </p:txBody>
+          </p:sp>
+        </mc:Choice>
+        <mc:Fallback>
+          <p:sp>
+            <p:nvSpPr>
+              <p:cNvPr id="4" name="TextBox 3">
+                <a:extLst>
+                  <a:ext uri="{FF2B5EF4-FFF2-40B4-BE49-F238E27FC236}">
+                    <a16:creationId xmlns:a16="http://schemas.microsoft.com/office/drawing/2014/main" id="{951A739A-6093-DE71-A396-46F1A2858793}"/>
+                  </a:ext>
+                </a:extLst>
+              </p:cNvPr>
+              <p:cNvSpPr txBox="1">
+                <a:spLocks noRot="1" noChangeAspect="1" noMove="1" noResize="1" noEditPoints="1" noAdjustHandles="1" noChangeArrowheads="1" noChangeShapeType="1" noTextEdit="1"/>
+              </p:cNvSpPr>
+              <p:nvPr/>
+            </p:nvSpPr>
+            <p:spPr>
+              <a:xfrm>
+                <a:off x="854903" y="4603055"/>
+                <a:ext cx="9538124" cy="553998"/>
+              </a:xfrm>
+              <a:prstGeom prst="rect">
+                <a:avLst/>
+              </a:prstGeom>
+              <a:blipFill>
+                <a:blip r:embed="rId4"/>
+                <a:stretch>
+                  <a:fillRect l="-665" t="-6667" b="-35556"/>
+                </a:stretch>
+              </a:blipFill>
+            </p:spPr>
+            <p:txBody>
+              <a:bodyPr/>
+              <a:lstStyle/>
+              <a:p>
+                <a:r>
+                  <a:rPr lang="en-US">
+                    <a:noFill/>
+                  </a:rPr>
+                  <a:t> </a:t>
+                </a:r>
+              </a:p>
+            </p:txBody>
+          </p:sp>
+        </mc:Fallback>
+      </mc:AlternateContent>
+      <mc:AlternateContent xmlns:mc="http://schemas.openxmlformats.org/markup-compatibility/2006">
+        <mc:Choice xmlns:a14="http://schemas.microsoft.com/office/drawing/2010/main" Requires="a14">
+          <p:sp>
+            <p:nvSpPr>
+              <p:cNvPr id="6" name="TextBox 5">
+                <a:extLst>
+                  <a:ext uri="{FF2B5EF4-FFF2-40B4-BE49-F238E27FC236}">
+                    <a16:creationId xmlns:a16="http://schemas.microsoft.com/office/drawing/2014/main" id="{AA88FF3C-DAB7-CE13-18F7-5AE1D7C56BA1}"/>
+                  </a:ext>
+                </a:extLst>
+              </p:cNvPr>
+              <p:cNvSpPr txBox="1"/>
+              <p:nvPr/>
+            </p:nvSpPr>
+            <p:spPr>
+              <a:xfrm>
+                <a:off x="933731" y="5308059"/>
+                <a:ext cx="9921883" cy="553998"/>
+              </a:xfrm>
+              <a:prstGeom prst="rect">
+                <a:avLst/>
+              </a:prstGeom>
+              <a:noFill/>
+            </p:spPr>
+            <p:txBody>
+              <a:bodyPr wrap="none" lIns="0" tIns="0" rIns="0" bIns="0" rtlCol="0">
+                <a:spAutoFit/>
+              </a:bodyPr>
+              <a:lstStyle/>
+              <a:p>
+                <a:pPr/>
+                <a14:m>
+                  <m:oMathPara xmlns:m="http://schemas.openxmlformats.org/officeDocument/2006/math">
+                    <m:oMathParaPr>
+                      <m:jc m:val="centerGroup"/>
+                    </m:oMathParaPr>
+                    <m:oMath xmlns:m="http://schemas.openxmlformats.org/officeDocument/2006/math">
+                      <m:r>
+                        <a:rPr lang="en-US" sz="3600" b="0" i="1" smtClean="0">
+                          <a:solidFill>
+                            <a:schemeClr val="bg1"/>
+                          </a:solidFill>
+                          <a:latin typeface="Cambria Math" panose="02040503050406030204" pitchFamily="18" charset="0"/>
+                        </a:rPr>
+                        <m:t>𝐺𝑙𝑢𝑐𝑜𝑠𝑒</m:t>
+                      </m:r>
+                      <m:r>
+                        <a:rPr lang="en-US" sz="3600" b="0" i="1" smtClean="0">
+                          <a:solidFill>
+                            <a:schemeClr val="bg1"/>
+                          </a:solidFill>
+                          <a:latin typeface="Cambria Math" panose="02040503050406030204" pitchFamily="18" charset="0"/>
+                        </a:rPr>
+                        <m:t>=102.01+(−7.47)</m:t>
+                      </m:r>
+                      <m:d>
+                        <m:dPr>
+                          <m:ctrlPr>
+                            <a:rPr lang="en-US" sz="3600" b="0" i="1" smtClean="0">
+                              <a:solidFill>
+                                <a:schemeClr val="bg1"/>
+                              </a:solidFill>
+                              <a:latin typeface="Cambria Math" panose="02040503050406030204" pitchFamily="18" charset="0"/>
+                            </a:rPr>
+                          </m:ctrlPr>
+                        </m:dPr>
+                        <m:e>
+                          <m:r>
+                            <a:rPr lang="en-US" sz="3600" b="0" i="1" smtClean="0">
+                              <a:solidFill>
+                                <a:schemeClr val="bg1"/>
+                              </a:solidFill>
+                              <a:latin typeface="Cambria Math" panose="02040503050406030204" pitchFamily="18" charset="0"/>
+                            </a:rPr>
+                            <m:t>1</m:t>
+                          </m:r>
+                        </m:e>
+                      </m:d>
+                      <m:r>
+                        <a:rPr lang="en-US" sz="3600" i="1">
+                          <a:solidFill>
+                            <a:schemeClr val="bg1"/>
+                          </a:solidFill>
+                          <a:latin typeface="Cambria Math" panose="02040503050406030204" pitchFamily="18" charset="0"/>
+                        </a:rPr>
+                        <m:t>+</m:t>
+                      </m:r>
+                      <m:r>
+                        <a:rPr lang="en-US" sz="3600" b="0" i="1" smtClean="0">
+                          <a:solidFill>
+                            <a:schemeClr val="bg1"/>
+                          </a:solidFill>
+                          <a:latin typeface="Cambria Math" panose="02040503050406030204" pitchFamily="18" charset="0"/>
+                        </a:rPr>
+                        <m:t>(0.76)</m:t>
+                      </m:r>
+                      <m:d>
+                        <m:dPr>
+                          <m:ctrlPr>
+                            <a:rPr lang="en-US" sz="3600" i="1">
+                              <a:solidFill>
+                                <a:schemeClr val="bg1"/>
+                              </a:solidFill>
+                              <a:latin typeface="Cambria Math" panose="02040503050406030204" pitchFamily="18" charset="0"/>
+                            </a:rPr>
+                          </m:ctrlPr>
+                        </m:dPr>
+                        <m:e>
+                          <m:r>
+                            <a:rPr lang="en-US" sz="3600" b="0" i="1" smtClean="0">
+                              <a:solidFill>
+                                <a:schemeClr val="bg1"/>
+                              </a:solidFill>
+                              <a:latin typeface="Cambria Math" panose="02040503050406030204" pitchFamily="18" charset="0"/>
+                            </a:rPr>
+                            <m:t>20</m:t>
+                          </m:r>
+                        </m:e>
+                      </m:d>
+                      <m:r>
+                        <a:rPr lang="en-US" sz="3600" b="0" i="1" smtClean="0">
+                          <a:solidFill>
+                            <a:schemeClr val="bg1"/>
+                          </a:solidFill>
+                          <a:latin typeface="Cambria Math" panose="02040503050406030204" pitchFamily="18" charset="0"/>
+                        </a:rPr>
+                        <m:t>+</m:t>
+                      </m:r>
+                      <m:r>
+                        <a:rPr lang="en-US" sz="3600" b="0" i="1" smtClean="0">
+                          <a:solidFill>
+                            <a:schemeClr val="bg1"/>
+                          </a:solidFill>
+                          <a:latin typeface="Cambria Math" panose="02040503050406030204" pitchFamily="18" charset="0"/>
+                          <a:ea typeface="Cambria Math" panose="02040503050406030204" pitchFamily="18" charset="0"/>
+                        </a:rPr>
+                        <m:t>𝜀</m:t>
+                      </m:r>
+                    </m:oMath>
+                  </m:oMathPara>
+                </a14:m>
+                <a:endParaRPr lang="en-US" sz="3600" dirty="0">
+                  <a:solidFill>
+                    <a:schemeClr val="bg1"/>
+                  </a:solidFill>
+                </a:endParaRPr>
+              </a:p>
+            </p:txBody>
+          </p:sp>
+        </mc:Choice>
+        <mc:Fallback>
+          <p:sp>
+            <p:nvSpPr>
+              <p:cNvPr id="6" name="TextBox 5">
+                <a:extLst>
+                  <a:ext uri="{FF2B5EF4-FFF2-40B4-BE49-F238E27FC236}">
+                    <a16:creationId xmlns:a16="http://schemas.microsoft.com/office/drawing/2014/main" id="{AA88FF3C-DAB7-CE13-18F7-5AE1D7C56BA1}"/>
+                  </a:ext>
+                </a:extLst>
+              </p:cNvPr>
+              <p:cNvSpPr txBox="1">
+                <a:spLocks noRot="1" noChangeAspect="1" noMove="1" noResize="1" noEditPoints="1" noAdjustHandles="1" noChangeArrowheads="1" noChangeShapeType="1" noTextEdit="1"/>
+              </p:cNvSpPr>
+              <p:nvPr/>
+            </p:nvSpPr>
+            <p:spPr>
+              <a:xfrm>
+                <a:off x="933731" y="5308059"/>
+                <a:ext cx="9921883" cy="553998"/>
+              </a:xfrm>
+              <a:prstGeom prst="rect">
+                <a:avLst/>
+              </a:prstGeom>
+              <a:blipFill>
+                <a:blip r:embed="rId5"/>
+                <a:stretch>
+                  <a:fillRect l="-639" b="-34091"/>
+                </a:stretch>
+              </a:blipFill>
+            </p:spPr>
+            <p:txBody>
+              <a:bodyPr/>
+              <a:lstStyle/>
+              <a:p>
+                <a:r>
+                  <a:rPr lang="en-US">
+                    <a:noFill/>
+                  </a:rPr>
+                  <a:t> </a:t>
+                </a:r>
+              </a:p>
+            </p:txBody>
+          </p:sp>
+        </mc:Fallback>
+      </mc:AlternateContent>
+      <mc:AlternateContent xmlns:mc="http://schemas.openxmlformats.org/markup-compatibility/2006">
+        <mc:Choice xmlns:a14="http://schemas.microsoft.com/office/drawing/2010/main" Requires="a14">
+          <p:sp>
+            <p:nvSpPr>
+              <p:cNvPr id="8" name="TextBox 7">
+                <a:extLst>
+                  <a:ext uri="{FF2B5EF4-FFF2-40B4-BE49-F238E27FC236}">
+                    <a16:creationId xmlns:a16="http://schemas.microsoft.com/office/drawing/2014/main" id="{352F8E9A-A190-2F9F-C089-3AAE0DB31C6B}"/>
+                  </a:ext>
+                </a:extLst>
+              </p:cNvPr>
+              <p:cNvSpPr txBox="1"/>
+              <p:nvPr/>
+            </p:nvSpPr>
+            <p:spPr>
+              <a:xfrm>
+                <a:off x="848771" y="5992369"/>
+                <a:ext cx="10091801" cy="553998"/>
+              </a:xfrm>
+              <a:prstGeom prst="rect">
+                <a:avLst/>
+              </a:prstGeom>
+              <a:noFill/>
+            </p:spPr>
+            <p:txBody>
+              <a:bodyPr wrap="none" lIns="0" tIns="0" rIns="0" bIns="0" rtlCol="0">
+                <a:spAutoFit/>
+              </a:bodyPr>
+              <a:lstStyle/>
+              <a:p>
+                <a:pPr/>
+                <a14:m>
+                  <m:oMathPara xmlns:m="http://schemas.openxmlformats.org/officeDocument/2006/math">
+                    <m:oMathParaPr>
+                      <m:jc m:val="centerGroup"/>
+                    </m:oMathParaPr>
+                    <m:oMath xmlns:m="http://schemas.openxmlformats.org/officeDocument/2006/math">
+                      <m:r>
+                        <a:rPr lang="en-US" sz="3600" b="0" i="1" smtClean="0">
+                          <a:solidFill>
+                            <a:schemeClr val="bg1"/>
+                          </a:solidFill>
+                          <a:latin typeface="Cambria Math" panose="02040503050406030204" pitchFamily="18" charset="0"/>
+                        </a:rPr>
+                        <m:t>𝐺𝑙𝑢𝑐𝑜𝑠𝑒</m:t>
+                      </m:r>
+                      <m:r>
+                        <a:rPr lang="en-US" sz="3600" b="0" i="1" smtClean="0">
+                          <a:solidFill>
+                            <a:schemeClr val="bg1"/>
+                          </a:solidFill>
+                          <a:latin typeface="Cambria Math" panose="02040503050406030204" pitchFamily="18" charset="0"/>
+                        </a:rPr>
+                        <m:t>=102.01+(−7.47)</m:t>
+                      </m:r>
+                      <m:d>
+                        <m:dPr>
+                          <m:ctrlPr>
+                            <a:rPr lang="en-US" sz="3600" b="0" i="1" smtClean="0">
+                              <a:solidFill>
+                                <a:schemeClr val="bg1"/>
+                              </a:solidFill>
+                              <a:latin typeface="Cambria Math" panose="02040503050406030204" pitchFamily="18" charset="0"/>
+                            </a:rPr>
+                          </m:ctrlPr>
+                        </m:dPr>
+                        <m:e>
+                          <m:r>
+                            <a:rPr lang="en-US" sz="3600" b="0" i="1" smtClean="0">
+                              <a:solidFill>
+                                <a:schemeClr val="bg1"/>
+                              </a:solidFill>
+                              <a:latin typeface="Cambria Math" panose="02040503050406030204" pitchFamily="18" charset="0"/>
+                            </a:rPr>
+                            <m:t>0</m:t>
+                          </m:r>
+                        </m:e>
+                      </m:d>
+                      <m:r>
+                        <a:rPr lang="en-US" sz="3600" i="1">
+                          <a:solidFill>
+                            <a:schemeClr val="bg1"/>
+                          </a:solidFill>
+                          <a:latin typeface="Cambria Math" panose="02040503050406030204" pitchFamily="18" charset="0"/>
+                        </a:rPr>
+                        <m:t>+</m:t>
+                      </m:r>
+                      <m:r>
+                        <a:rPr lang="en-US" sz="3600" b="0" i="1" smtClean="0">
+                          <a:solidFill>
+                            <a:schemeClr val="bg1"/>
+                          </a:solidFill>
+                          <a:latin typeface="Cambria Math" panose="02040503050406030204" pitchFamily="18" charset="0"/>
+                        </a:rPr>
+                        <m:t>(0.76)</m:t>
+                      </m:r>
+                      <m:d>
+                        <m:dPr>
+                          <m:ctrlPr>
+                            <a:rPr lang="en-US" sz="3600" i="1">
+                              <a:solidFill>
+                                <a:schemeClr val="bg1"/>
+                              </a:solidFill>
+                              <a:latin typeface="Cambria Math" panose="02040503050406030204" pitchFamily="18" charset="0"/>
+                            </a:rPr>
+                          </m:ctrlPr>
+                        </m:dPr>
+                        <m:e>
+                          <m:r>
+                            <a:rPr lang="en-US" sz="3600" b="0" i="1" smtClean="0">
+                              <a:solidFill>
+                                <a:schemeClr val="bg1"/>
+                              </a:solidFill>
+                              <a:latin typeface="Cambria Math" panose="02040503050406030204" pitchFamily="18" charset="0"/>
+                            </a:rPr>
+                            <m:t>20</m:t>
+                          </m:r>
+                        </m:e>
+                      </m:d>
+                      <m:r>
+                        <a:rPr lang="en-US" sz="3600" b="0" i="1" smtClean="0">
+                          <a:solidFill>
+                            <a:schemeClr val="bg1"/>
+                          </a:solidFill>
+                          <a:latin typeface="Cambria Math" panose="02040503050406030204" pitchFamily="18" charset="0"/>
+                        </a:rPr>
+                        <m:t>+</m:t>
+                      </m:r>
+                      <m:r>
+                        <a:rPr lang="en-US" sz="3600" b="0" i="1" smtClean="0">
+                          <a:solidFill>
+                            <a:schemeClr val="bg1"/>
+                          </a:solidFill>
+                          <a:latin typeface="Cambria Math" panose="02040503050406030204" pitchFamily="18" charset="0"/>
+                          <a:ea typeface="Cambria Math" panose="02040503050406030204" pitchFamily="18" charset="0"/>
+                        </a:rPr>
+                        <m:t>𝜀</m:t>
+                      </m:r>
+                    </m:oMath>
+                  </m:oMathPara>
+                </a14:m>
+                <a:endParaRPr lang="en-US" sz="3600" dirty="0">
+                  <a:solidFill>
+                    <a:schemeClr val="bg1"/>
+                  </a:solidFill>
+                </a:endParaRPr>
+              </a:p>
+            </p:txBody>
+          </p:sp>
+        </mc:Choice>
+        <mc:Fallback>
+          <p:sp>
+            <p:nvSpPr>
+              <p:cNvPr id="8" name="TextBox 7">
+                <a:extLst>
+                  <a:ext uri="{FF2B5EF4-FFF2-40B4-BE49-F238E27FC236}">
+                    <a16:creationId xmlns:a16="http://schemas.microsoft.com/office/drawing/2014/main" id="{352F8E9A-A190-2F9F-C089-3AAE0DB31C6B}"/>
+                  </a:ext>
+                </a:extLst>
+              </p:cNvPr>
+              <p:cNvSpPr txBox="1">
+                <a:spLocks noRot="1" noChangeAspect="1" noMove="1" noResize="1" noEditPoints="1" noAdjustHandles="1" noChangeArrowheads="1" noChangeShapeType="1" noTextEdit="1"/>
+              </p:cNvSpPr>
+              <p:nvPr/>
+            </p:nvSpPr>
+            <p:spPr>
+              <a:xfrm>
+                <a:off x="848771" y="5992369"/>
+                <a:ext cx="10091801" cy="553998"/>
+              </a:xfrm>
+              <a:prstGeom prst="rect">
+                <a:avLst/>
+              </a:prstGeom>
+              <a:blipFill>
+                <a:blip r:embed="rId6"/>
+                <a:stretch>
+                  <a:fillRect b="-33333"/>
+                </a:stretch>
+              </a:blipFill>
+            </p:spPr>
+            <p:txBody>
+              <a:bodyPr/>
+              <a:lstStyle/>
+              <a:p>
+                <a:r>
+                  <a:rPr lang="en-US">
+                    <a:noFill/>
+                  </a:rPr>
+                  <a:t> </a:t>
+                </a:r>
+              </a:p>
+            </p:txBody>
+          </p:sp>
+        </mc:Fallback>
+      </mc:AlternateContent>
+      <p:pic>
+        <p:nvPicPr>
+          <p:cNvPr id="10" name="Picture 9">
+            <a:extLst>
+              <a:ext uri="{FF2B5EF4-FFF2-40B4-BE49-F238E27FC236}">
+                <a16:creationId xmlns:a16="http://schemas.microsoft.com/office/drawing/2014/main" id="{177B7350-5985-F49A-1075-52D62A29FAC5}"/>
+              </a:ext>
+            </a:extLst>
+          </p:cNvPr>
+          <p:cNvPicPr>
+            <a:picLocks noChangeAspect="1"/>
+          </p:cNvPicPr>
+          <p:nvPr/>
+        </p:nvPicPr>
+        <p:blipFill>
+          <a:blip r:embed="rId7">
+            <a:extLst>
+              <a:ext uri="{28A0092B-C50C-407E-A947-70E740481C1C}">
+                <a14:useLocalDpi xmlns:a14="http://schemas.microsoft.com/office/drawing/2010/main" val="0"/>
+              </a:ext>
+            </a:extLst>
+          </a:blip>
+          <a:stretch>
+            <a:fillRect/>
+          </a:stretch>
+        </p:blipFill>
+        <p:spPr>
+          <a:xfrm>
+            <a:off x="6177350" y="2146906"/>
+            <a:ext cx="2792361" cy="2147970"/>
+          </a:xfrm>
+          <a:prstGeom prst="rect">
+            <a:avLst/>
+          </a:prstGeom>
+        </p:spPr>
+      </p:pic>
+    </p:spTree>
+    <p:extLst>
+      <p:ext uri="{BB962C8B-B14F-4D97-AF65-F5344CB8AC3E}">
+        <p14:creationId xmlns:p14="http://schemas.microsoft.com/office/powerpoint/2010/main" val="1080692324"/>
+      </p:ext>
+    </p:extLst>
+  </p:cSld>
+  <p:clrMapOvr>
+    <a:masterClrMapping/>
+  </p:clrMapOvr>
+  <p:timing>
+    <p:tnLst>
+      <p:par>
+        <p:cTn id="1" dur="indefinite" restart="never" nodeType="tmRoot">
+          <p:childTnLst>
+            <p:seq concurrent="1" nextAc="seek">
+              <p:cTn id="2" dur="indefinite" nodeType="mainSeq">
+                <p:childTnLst>
+                  <p:par>
+                    <p:cTn id="3" fill="hold">
+                      <p:stCondLst>
+                        <p:cond delay="indefinite"/>
+                      </p:stCondLst>
+                      <p:childTnLst>
+                        <p:par>
+                          <p:cTn id="4" fill="hold">
+                            <p:stCondLst>
+                              <p:cond delay="0"/>
+                            </p:stCondLst>
+                            <p:childTnLst>
+                              <p:par>
+                                <p:cTn id="5" presetID="22" presetClass="entr" presetSubtype="8" fill="hold" grpId="0" nodeType="clickEffect">
+                                  <p:stCondLst>
+                                    <p:cond delay="0"/>
+                                  </p:stCondLst>
+                                  <p:childTnLst>
+                                    <p:set>
+                                      <p:cBhvr>
+                                        <p:cTn id="6" dur="1" fill="hold">
+                                          <p:stCondLst>
+                                            <p:cond delay="0"/>
+                                          </p:stCondLst>
+                                        </p:cTn>
+                                        <p:tgtEl>
+                                          <p:spTgt spid="4"/>
+                                        </p:tgtEl>
+                                        <p:attrNameLst>
+                                          <p:attrName>style.visibility</p:attrName>
+                                        </p:attrNameLst>
+                                      </p:cBhvr>
+                                      <p:to>
+                                        <p:strVal val="visible"/>
+                                      </p:to>
+                                    </p:set>
+                                    <p:animEffect transition="in" filter="wipe(left)">
+                                      <p:cBhvr>
+                                        <p:cTn id="7" dur="500"/>
+                                        <p:tgtEl>
+                                          <p:spTgt spid="4"/>
+                                        </p:tgtEl>
+                                      </p:cBhvr>
+                                    </p:animEffect>
+                                  </p:childTnLst>
+                                </p:cTn>
+                              </p:par>
+                            </p:childTnLst>
+                          </p:cTn>
+                        </p:par>
+                      </p:childTnLst>
+                    </p:cTn>
+                  </p:par>
+                  <p:par>
+                    <p:cTn id="8" fill="hold">
+                      <p:stCondLst>
+                        <p:cond delay="indefinite"/>
+                      </p:stCondLst>
+                      <p:childTnLst>
+                        <p:par>
+                          <p:cTn id="9" fill="hold">
+                            <p:stCondLst>
+                              <p:cond delay="0"/>
+                            </p:stCondLst>
+                            <p:childTnLst>
+                              <p:par>
+                                <p:cTn id="10" presetID="22" presetClass="entr" presetSubtype="8" fill="hold" grpId="0" nodeType="clickEffect">
+                                  <p:stCondLst>
+                                    <p:cond delay="0"/>
+                                  </p:stCondLst>
+                                  <p:childTnLst>
+                                    <p:set>
+                                      <p:cBhvr>
+                                        <p:cTn id="11" dur="1" fill="hold">
+                                          <p:stCondLst>
+                                            <p:cond delay="0"/>
+                                          </p:stCondLst>
+                                        </p:cTn>
+                                        <p:tgtEl>
+                                          <p:spTgt spid="6"/>
+                                        </p:tgtEl>
+                                        <p:attrNameLst>
+                                          <p:attrName>style.visibility</p:attrName>
+                                        </p:attrNameLst>
+                                      </p:cBhvr>
+                                      <p:to>
+                                        <p:strVal val="visible"/>
+                                      </p:to>
+                                    </p:set>
+                                    <p:animEffect transition="in" filter="wipe(left)">
+                                      <p:cBhvr>
+                                        <p:cTn id="12" dur="500"/>
+                                        <p:tgtEl>
+                                          <p:spTgt spid="6"/>
+                                        </p:tgtEl>
+                                      </p:cBhvr>
+                                    </p:animEffect>
+                                  </p:childTnLst>
+                                </p:cTn>
+                              </p:par>
+                            </p:childTnLst>
+                          </p:cTn>
+                        </p:par>
+                      </p:childTnLst>
+                    </p:cTn>
+                  </p:par>
+                  <p:par>
+                    <p:cTn id="13" fill="hold">
+                      <p:stCondLst>
+                        <p:cond delay="indefinite"/>
+                      </p:stCondLst>
+                      <p:childTnLst>
+                        <p:par>
+                          <p:cTn id="14" fill="hold">
+                            <p:stCondLst>
+                              <p:cond delay="0"/>
+                            </p:stCondLst>
+                            <p:childTnLst>
+                              <p:par>
+                                <p:cTn id="15" presetID="22" presetClass="entr" presetSubtype="8" fill="hold" grpId="0" nodeType="clickEffect">
+                                  <p:stCondLst>
+                                    <p:cond delay="0"/>
+                                  </p:stCondLst>
+                                  <p:childTnLst>
+                                    <p:set>
+                                      <p:cBhvr>
+                                        <p:cTn id="16" dur="1" fill="hold">
+                                          <p:stCondLst>
+                                            <p:cond delay="0"/>
+                                          </p:stCondLst>
+                                        </p:cTn>
+                                        <p:tgtEl>
+                                          <p:spTgt spid="8"/>
+                                        </p:tgtEl>
+                                        <p:attrNameLst>
+                                          <p:attrName>style.visibility</p:attrName>
+                                        </p:attrNameLst>
+                                      </p:cBhvr>
+                                      <p:to>
+                                        <p:strVal val="visible"/>
+                                      </p:to>
+                                    </p:set>
+                                    <p:animEffect transition="in" filter="wipe(left)">
+                                      <p:cBhvr>
+                                        <p:cTn id="17" dur="500"/>
+                                        <p:tgtEl>
+                                          <p:spTgt spid="8"/>
+                                        </p:tgtEl>
+                                      </p:cBhvr>
+                                    </p:animEffect>
+                                  </p:childTnLst>
+                                </p:cTn>
+                              </p:par>
+                            </p:childTnLst>
+                          </p:cTn>
+                        </p:par>
+                      </p:childTnLst>
+                    </p:cTn>
+                  </p:par>
+                </p:childTnLst>
+              </p:cTn>
+              <p:prevCondLst>
+                <p:cond evt="onPrev" delay="0">
+                  <p:tgtEl>
+                    <p:sldTgt/>
+                  </p:tgtEl>
+                </p:cond>
+              </p:prevCondLst>
+              <p:nextCondLst>
+                <p:cond evt="onNext" delay="0">
+                  <p:tgtEl>
+                    <p:sldTgt/>
+                  </p:tgtEl>
+                </p:cond>
+              </p:nextCondLst>
+            </p:seq>
+          </p:childTnLst>
+        </p:cTn>
+      </p:par>
+    </p:tnLst>
+    <p:bldLst>
+      <p:bldP spid="4" grpId="0"/>
+      <p:bldP spid="6" grpId="0"/>
+      <p:bldP spid="8" grpId="0"/>
+    </p:bldLst>
+  </p:timing>
+</p:sld>
+</file>
+
+<file path=ppt/slides/slide14.xml><?xml version="1.0" encoding="utf-8"?>
+<p:sld xmlns:a="http://schemas.openxmlformats.org/drawingml/2006/main" xmlns:r="http://schemas.openxmlformats.org/officeDocument/2006/relationships" xmlns:p="http://schemas.openxmlformats.org/presentationml/2006/main">
+  <p:cSld>
+    <p:spTree>
+      <p:nvGrpSpPr>
         <p:cNvPr id="1" name=""/>
         <p:cNvGrpSpPr/>
         <p:nvPr/>

</xml_diff>